<commit_message>
first changed icons (WIP)
</commit_message>
<xml_diff>
--- a/src/XmlNotepad/Resources/Template.pptx
+++ b/src/XmlNotepad/Resources/Template.pptx
@@ -104,6 +104,11 @@
       </a:defRPr>
     </a:lvl9pPr>
   </p:defaultTextStyle>
+  <p:extLst>
+    <p:ext uri="{EFAFB233-063F-42B5-8137-9DF3F51BA10A}">
+      <p15:sldGuideLst xmlns:p15="http://schemas.microsoft.com/office/powerpoint/2012/main"/>
+    </p:ext>
+  </p:extLst>
 </p:presentation>
 </file>
 
@@ -254,7 +259,7 @@
           <a:p>
             <a:fld id="{02E52304-3A83-450B-BDCA-01479425630C}" type="datetimeFigureOut">
               <a:rPr lang="en-US" smtClean="0"/>
-              <a:t>5/30/2020</a:t>
+              <a:t>1/31/2024</a:t>
             </a:fld>
             <a:endParaRPr lang="en-US"/>
           </a:p>
@@ -308,7 +313,7 @@
           <a:p>
             <a:fld id="{7C93D960-3A75-4644-9111-39BE6508A1C0}" type="slidenum">
               <a:rPr lang="en-US" smtClean="0"/>
-              <a:t>‹#›</a:t>
+              <a:t>‹nr.›</a:t>
             </a:fld>
             <a:endParaRPr lang="en-US"/>
           </a:p>
@@ -452,7 +457,7 @@
           <a:p>
             <a:fld id="{02E52304-3A83-450B-BDCA-01479425630C}" type="datetimeFigureOut">
               <a:rPr lang="en-US" smtClean="0"/>
-              <a:t>5/30/2020</a:t>
+              <a:t>1/31/2024</a:t>
             </a:fld>
             <a:endParaRPr lang="en-US"/>
           </a:p>
@@ -506,7 +511,7 @@
           <a:p>
             <a:fld id="{7C93D960-3A75-4644-9111-39BE6508A1C0}" type="slidenum">
               <a:rPr lang="en-US" smtClean="0"/>
-              <a:t>‹#›</a:t>
+              <a:t>‹nr.›</a:t>
             </a:fld>
             <a:endParaRPr lang="en-US"/>
           </a:p>
@@ -660,7 +665,7 @@
           <a:p>
             <a:fld id="{02E52304-3A83-450B-BDCA-01479425630C}" type="datetimeFigureOut">
               <a:rPr lang="en-US" smtClean="0"/>
-              <a:t>5/30/2020</a:t>
+              <a:t>1/31/2024</a:t>
             </a:fld>
             <a:endParaRPr lang="en-US"/>
           </a:p>
@@ -714,7 +719,7 @@
           <a:p>
             <a:fld id="{7C93D960-3A75-4644-9111-39BE6508A1C0}" type="slidenum">
               <a:rPr lang="en-US" smtClean="0"/>
-              <a:t>‹#›</a:t>
+              <a:t>‹nr.›</a:t>
             </a:fld>
             <a:endParaRPr lang="en-US"/>
           </a:p>
@@ -858,7 +863,7 @@
           <a:p>
             <a:fld id="{02E52304-3A83-450B-BDCA-01479425630C}" type="datetimeFigureOut">
               <a:rPr lang="en-US" smtClean="0"/>
-              <a:t>5/30/2020</a:t>
+              <a:t>1/31/2024</a:t>
             </a:fld>
             <a:endParaRPr lang="en-US"/>
           </a:p>
@@ -912,7 +917,7 @@
           <a:p>
             <a:fld id="{7C93D960-3A75-4644-9111-39BE6508A1C0}" type="slidenum">
               <a:rPr lang="en-US" smtClean="0"/>
-              <a:t>‹#›</a:t>
+              <a:t>‹nr.›</a:t>
             </a:fld>
             <a:endParaRPr lang="en-US"/>
           </a:p>
@@ -1133,7 +1138,7 @@
           <a:p>
             <a:fld id="{02E52304-3A83-450B-BDCA-01479425630C}" type="datetimeFigureOut">
               <a:rPr lang="en-US" smtClean="0"/>
-              <a:t>5/30/2020</a:t>
+              <a:t>1/31/2024</a:t>
             </a:fld>
             <a:endParaRPr lang="en-US"/>
           </a:p>
@@ -1187,7 +1192,7 @@
           <a:p>
             <a:fld id="{7C93D960-3A75-4644-9111-39BE6508A1C0}" type="slidenum">
               <a:rPr lang="en-US" smtClean="0"/>
-              <a:t>‹#›</a:t>
+              <a:t>‹nr.›</a:t>
             </a:fld>
             <a:endParaRPr lang="en-US"/>
           </a:p>
@@ -1398,7 +1403,7 @@
           <a:p>
             <a:fld id="{02E52304-3A83-450B-BDCA-01479425630C}" type="datetimeFigureOut">
               <a:rPr lang="en-US" smtClean="0"/>
-              <a:t>5/30/2020</a:t>
+              <a:t>1/31/2024</a:t>
             </a:fld>
             <a:endParaRPr lang="en-US"/>
           </a:p>
@@ -1452,7 +1457,7 @@
           <a:p>
             <a:fld id="{7C93D960-3A75-4644-9111-39BE6508A1C0}" type="slidenum">
               <a:rPr lang="en-US" smtClean="0"/>
-              <a:t>‹#›</a:t>
+              <a:t>‹nr.›</a:t>
             </a:fld>
             <a:endParaRPr lang="en-US"/>
           </a:p>
@@ -1810,7 +1815,7 @@
           <a:p>
             <a:fld id="{02E52304-3A83-450B-BDCA-01479425630C}" type="datetimeFigureOut">
               <a:rPr lang="en-US" smtClean="0"/>
-              <a:t>5/30/2020</a:t>
+              <a:t>1/31/2024</a:t>
             </a:fld>
             <a:endParaRPr lang="en-US"/>
           </a:p>
@@ -1864,7 +1869,7 @@
           <a:p>
             <a:fld id="{7C93D960-3A75-4644-9111-39BE6508A1C0}" type="slidenum">
               <a:rPr lang="en-US" smtClean="0"/>
-              <a:t>‹#›</a:t>
+              <a:t>‹nr.›</a:t>
             </a:fld>
             <a:endParaRPr lang="en-US"/>
           </a:p>
@@ -1951,7 +1956,7 @@
           <a:p>
             <a:fld id="{02E52304-3A83-450B-BDCA-01479425630C}" type="datetimeFigureOut">
               <a:rPr lang="en-US" smtClean="0"/>
-              <a:t>5/30/2020</a:t>
+              <a:t>1/31/2024</a:t>
             </a:fld>
             <a:endParaRPr lang="en-US"/>
           </a:p>
@@ -2005,7 +2010,7 @@
           <a:p>
             <a:fld id="{7C93D960-3A75-4644-9111-39BE6508A1C0}" type="slidenum">
               <a:rPr lang="en-US" smtClean="0"/>
-              <a:t>‹#›</a:t>
+              <a:t>‹nr.›</a:t>
             </a:fld>
             <a:endParaRPr lang="en-US"/>
           </a:p>
@@ -2064,7 +2069,7 @@
           <a:p>
             <a:fld id="{02E52304-3A83-450B-BDCA-01479425630C}" type="datetimeFigureOut">
               <a:rPr lang="en-US" smtClean="0"/>
-              <a:t>5/30/2020</a:t>
+              <a:t>1/31/2024</a:t>
             </a:fld>
             <a:endParaRPr lang="en-US"/>
           </a:p>
@@ -2118,7 +2123,7 @@
           <a:p>
             <a:fld id="{7C93D960-3A75-4644-9111-39BE6508A1C0}" type="slidenum">
               <a:rPr lang="en-US" smtClean="0"/>
-              <a:t>‹#›</a:t>
+              <a:t>‹nr.›</a:t>
             </a:fld>
             <a:endParaRPr lang="en-US"/>
           </a:p>
@@ -2375,7 +2380,7 @@
           <a:p>
             <a:fld id="{02E52304-3A83-450B-BDCA-01479425630C}" type="datetimeFigureOut">
               <a:rPr lang="en-US" smtClean="0"/>
-              <a:t>5/30/2020</a:t>
+              <a:t>1/31/2024</a:t>
             </a:fld>
             <a:endParaRPr lang="en-US"/>
           </a:p>
@@ -2429,7 +2434,7 @@
           <a:p>
             <a:fld id="{7C93D960-3A75-4644-9111-39BE6508A1C0}" type="slidenum">
               <a:rPr lang="en-US" smtClean="0"/>
-              <a:t>‹#›</a:t>
+              <a:t>‹nr.›</a:t>
             </a:fld>
             <a:endParaRPr lang="en-US"/>
           </a:p>
@@ -2663,7 +2668,7 @@
           <a:p>
             <a:fld id="{02E52304-3A83-450B-BDCA-01479425630C}" type="datetimeFigureOut">
               <a:rPr lang="en-US" smtClean="0"/>
-              <a:t>5/30/2020</a:t>
+              <a:t>1/31/2024</a:t>
             </a:fld>
             <a:endParaRPr lang="en-US"/>
           </a:p>
@@ -2717,7 +2722,7 @@
           <a:p>
             <a:fld id="{7C93D960-3A75-4644-9111-39BE6508A1C0}" type="slidenum">
               <a:rPr lang="en-US" smtClean="0"/>
-              <a:t>‹#›</a:t>
+              <a:t>‹nr.›</a:t>
             </a:fld>
             <a:endParaRPr lang="en-US"/>
           </a:p>
@@ -2904,7 +2909,7 @@
           <a:p>
             <a:fld id="{02E52304-3A83-450B-BDCA-01479425630C}" type="datetimeFigureOut">
               <a:rPr lang="en-US" smtClean="0"/>
-              <a:t>5/30/2020</a:t>
+              <a:t>1/31/2024</a:t>
             </a:fld>
             <a:endParaRPr lang="en-US"/>
           </a:p>
@@ -2994,7 +2999,7 @@
           <a:p>
             <a:fld id="{7C93D960-3A75-4644-9111-39BE6508A1C0}" type="slidenum">
               <a:rPr lang="en-US" smtClean="0"/>
-              <a:t>‹#›</a:t>
+              <a:t>‹nr.›</a:t>
             </a:fld>
             <a:endParaRPr lang="en-US"/>
           </a:p>
@@ -3321,230 +3326,114 @@
           <a:chExt cx="0" cy="0"/>
         </a:xfrm>
       </p:grpSpPr>
-      <p:sp>
-        <p:nvSpPr>
-          <p:cNvPr id="4" name="Oval 3">
-            <a:extLst>
-              <a:ext uri="{FF2B5EF4-FFF2-40B4-BE49-F238E27FC236}">
-                <a16:creationId xmlns:a16="http://schemas.microsoft.com/office/drawing/2014/main" id="{3F1274B8-7005-4930-A3CF-0C6961754857}"/>
-              </a:ext>
-            </a:extLst>
-          </p:cNvPr>
-          <p:cNvSpPr/>
+      <p:pic>
+        <p:nvPicPr>
+          <p:cNvPr id="3" name="Afbeelding 2" descr="Afbeelding met cirkel, Kleurrijkheid, paars, Lila&#10;&#10;Automatisch gegenereerde beschrijving">
+            <a:extLst>
+              <a:ext uri="{FF2B5EF4-FFF2-40B4-BE49-F238E27FC236}">
+                <a16:creationId xmlns:a16="http://schemas.microsoft.com/office/drawing/2014/main" id="{E9D828C6-71E7-0D32-4EEF-661633939530}"/>
+              </a:ext>
+            </a:extLst>
+          </p:cNvPr>
+          <p:cNvPicPr>
+            <a:picLocks noChangeAspect="1"/>
+          </p:cNvPicPr>
           <p:nvPr/>
-        </p:nvSpPr>
+        </p:nvPicPr>
+        <p:blipFill>
+          <a:blip r:embed="rId2">
+            <a:extLst>
+              <a:ext uri="{28A0092B-C50C-407E-A947-70E740481C1C}">
+                <a14:useLocalDpi xmlns:a14="http://schemas.microsoft.com/office/drawing/2010/main" val="0"/>
+              </a:ext>
+            </a:extLst>
+          </a:blip>
+          <a:stretch>
+            <a:fillRect/>
+          </a:stretch>
+        </p:blipFill>
         <p:spPr>
           <a:xfrm>
-            <a:off x="723899" y="604751"/>
-            <a:ext cx="146304" cy="146304"/>
+            <a:off x="722603" y="604751"/>
+            <a:ext cx="147600" cy="145434"/>
           </a:xfrm>
-          <a:prstGeom prst="ellipse">
+          <a:prstGeom prst="rect">
             <a:avLst/>
           </a:prstGeom>
-          <a:gradFill flip="none" rotWithShape="1">
-            <a:gsLst>
-              <a:gs pos="0">
-                <a:srgbClr val="7030A0">
-                  <a:lumMod val="52000"/>
-                </a:srgbClr>
-              </a:gs>
-              <a:gs pos="48000">
-                <a:srgbClr val="7030A0"/>
-              </a:gs>
-              <a:gs pos="100000">
-                <a:srgbClr val="7030A0">
-                  <a:lumMod val="39000"/>
-                  <a:lumOff val="61000"/>
-                </a:srgbClr>
-              </a:gs>
-            </a:gsLst>
-            <a:lin ang="18900000" scaled="0"/>
-            <a:tileRect/>
-          </a:gradFill>
-          <a:ln>
-            <a:noFill/>
-          </a:ln>
-          <a:effectLst>
-            <a:outerShdw blurRad="50800" dist="38100" dir="8100000" algn="tr" rotWithShape="0">
-              <a:prstClr val="black">
-                <a:alpha val="40000"/>
-              </a:prstClr>
-            </a:outerShdw>
-          </a:effectLst>
         </p:spPr>
-        <p:style>
-          <a:lnRef idx="0">
-            <a:scrgbClr r="0" g="0" b="0"/>
-          </a:lnRef>
-          <a:fillRef idx="0">
-            <a:scrgbClr r="0" g="0" b="0"/>
-          </a:fillRef>
-          <a:effectRef idx="0">
-            <a:scrgbClr r="0" g="0" b="0"/>
-          </a:effectRef>
-          <a:fontRef idx="minor">
-            <a:schemeClr val="lt1"/>
-          </a:fontRef>
-        </p:style>
-        <p:txBody>
-          <a:bodyPr rtlCol="0" anchor="ctr"/>
-          <a:lstStyle/>
-          <a:p>
-            <a:pPr algn="ctr"/>
-            <a:endParaRPr lang="en-US"/>
-          </a:p>
-        </p:txBody>
-      </p:sp>
-      <p:sp>
-        <p:nvSpPr>
-          <p:cNvPr id="5" name="Oval 4">
-            <a:extLst>
-              <a:ext uri="{FF2B5EF4-FFF2-40B4-BE49-F238E27FC236}">
-                <a16:creationId xmlns:a16="http://schemas.microsoft.com/office/drawing/2014/main" id="{0105A13A-E57F-444F-B43B-169207201382}"/>
-              </a:ext>
-            </a:extLst>
-          </p:cNvPr>
-          <p:cNvSpPr/>
+      </p:pic>
+      <p:pic>
+        <p:nvPicPr>
+          <p:cNvPr id="8" name="Afbeelding 7" descr="Afbeelding met cirkel, Kleurrijkheid&#10;&#10;Automatisch gegenereerde beschrijving">
+            <a:extLst>
+              <a:ext uri="{FF2B5EF4-FFF2-40B4-BE49-F238E27FC236}">
+                <a16:creationId xmlns:a16="http://schemas.microsoft.com/office/drawing/2014/main" id="{B4C59F74-B2CA-24F7-519C-AB843B18D038}"/>
+              </a:ext>
+            </a:extLst>
+          </p:cNvPr>
+          <p:cNvPicPr>
+            <a:picLocks noChangeAspect="1"/>
+          </p:cNvPicPr>
           <p:nvPr/>
-        </p:nvSpPr>
+        </p:nvPicPr>
+        <p:blipFill>
+          <a:blip r:embed="rId3">
+            <a:extLst>
+              <a:ext uri="{28A0092B-C50C-407E-A947-70E740481C1C}">
+                <a14:useLocalDpi xmlns:a14="http://schemas.microsoft.com/office/drawing/2010/main" val="0"/>
+              </a:ext>
+            </a:extLst>
+          </a:blip>
+          <a:stretch>
+            <a:fillRect/>
+          </a:stretch>
+        </p:blipFill>
         <p:spPr>
           <a:xfrm>
-            <a:off x="1200149" y="604751"/>
-            <a:ext cx="146304" cy="146304"/>
+            <a:off x="1196472" y="602585"/>
+            <a:ext cx="147600" cy="147600"/>
           </a:xfrm>
-          <a:prstGeom prst="ellipse">
+          <a:prstGeom prst="rect">
             <a:avLst/>
           </a:prstGeom>
-          <a:gradFill flip="none" rotWithShape="1">
-            <a:gsLst>
-              <a:gs pos="0">
-                <a:schemeClr val="accent6">
-                  <a:lumMod val="34000"/>
-                </a:schemeClr>
-              </a:gs>
-              <a:gs pos="48000">
-                <a:schemeClr val="accent6">
-                  <a:lumMod val="75000"/>
-                </a:schemeClr>
-              </a:gs>
-              <a:gs pos="100000">
-                <a:schemeClr val="accent6">
-                  <a:lumMod val="63000"/>
-                  <a:lumOff val="37000"/>
-                </a:schemeClr>
-              </a:gs>
-            </a:gsLst>
-            <a:lin ang="18900000" scaled="0"/>
-            <a:tileRect/>
-          </a:gradFill>
-          <a:ln>
-            <a:noFill/>
-          </a:ln>
-          <a:effectLst>
-            <a:outerShdw blurRad="50800" dist="38100" dir="8100000" algn="tr" rotWithShape="0">
-              <a:prstClr val="black">
-                <a:alpha val="40000"/>
-              </a:prstClr>
-            </a:outerShdw>
-          </a:effectLst>
         </p:spPr>
-        <p:style>
-          <a:lnRef idx="0">
-            <a:scrgbClr r="0" g="0" b="0"/>
-          </a:lnRef>
-          <a:fillRef idx="0">
-            <a:scrgbClr r="0" g="0" b="0"/>
-          </a:fillRef>
-          <a:effectRef idx="0">
-            <a:scrgbClr r="0" g="0" b="0"/>
-          </a:effectRef>
-          <a:fontRef idx="minor">
-            <a:schemeClr val="lt1"/>
-          </a:fontRef>
-        </p:style>
-        <p:txBody>
-          <a:bodyPr rtlCol="0" anchor="ctr"/>
-          <a:lstStyle/>
-          <a:p>
-            <a:pPr algn="ctr"/>
-            <a:endParaRPr lang="en-US"/>
-          </a:p>
-        </p:txBody>
-      </p:sp>
-      <p:sp>
-        <p:nvSpPr>
-          <p:cNvPr id="6" name="Oval 5">
-            <a:extLst>
-              <a:ext uri="{FF2B5EF4-FFF2-40B4-BE49-F238E27FC236}">
-                <a16:creationId xmlns:a16="http://schemas.microsoft.com/office/drawing/2014/main" id="{8031DA44-8955-4AAB-852D-B9B6A8DFAE99}"/>
-              </a:ext>
-            </a:extLst>
-          </p:cNvPr>
-          <p:cNvSpPr/>
+      </p:pic>
+      <p:pic>
+        <p:nvPicPr>
+          <p:cNvPr id="10" name="Afbeelding 9" descr="Afbeelding met cirkel, Kleurrijkheid&#10;&#10;Automatisch gegenereerde beschrijving">
+            <a:extLst>
+              <a:ext uri="{FF2B5EF4-FFF2-40B4-BE49-F238E27FC236}">
+                <a16:creationId xmlns:a16="http://schemas.microsoft.com/office/drawing/2014/main" id="{35FF7471-4C5F-FBBC-83F8-99104019F8F0}"/>
+              </a:ext>
+            </a:extLst>
+          </p:cNvPr>
+          <p:cNvPicPr>
+            <a:picLocks noChangeAspect="1"/>
+          </p:cNvPicPr>
           <p:nvPr/>
-        </p:nvSpPr>
+        </p:nvPicPr>
+        <p:blipFill>
+          <a:blip r:embed="rId4">
+            <a:extLst>
+              <a:ext uri="{28A0092B-C50C-407E-A947-70E740481C1C}">
+                <a14:useLocalDpi xmlns:a14="http://schemas.microsoft.com/office/drawing/2010/main" val="0"/>
+              </a:ext>
+            </a:extLst>
+          </a:blip>
+          <a:stretch>
+            <a:fillRect/>
+          </a:stretch>
+        </p:blipFill>
         <p:spPr>
           <a:xfrm>
-            <a:off x="1603247" y="604751"/>
-            <a:ext cx="146304" cy="146304"/>
+            <a:off x="1617534" y="602585"/>
+            <a:ext cx="147600" cy="147600"/>
           </a:xfrm>
-          <a:prstGeom prst="ellipse">
+          <a:prstGeom prst="rect">
             <a:avLst/>
           </a:prstGeom>
-          <a:gradFill flip="none" rotWithShape="1">
-            <a:gsLst>
-              <a:gs pos="0">
-                <a:schemeClr val="accent2">
-                  <a:lumMod val="43000"/>
-                </a:schemeClr>
-              </a:gs>
-              <a:gs pos="48000">
-                <a:srgbClr val="FF3300"/>
-              </a:gs>
-              <a:gs pos="100000">
-                <a:srgbClr val="FF0000">
-                  <a:lumMod val="32000"/>
-                  <a:lumOff val="68000"/>
-                </a:srgbClr>
-              </a:gs>
-            </a:gsLst>
-            <a:lin ang="18900000" scaled="0"/>
-            <a:tileRect/>
-          </a:gradFill>
-          <a:ln>
-            <a:noFill/>
-          </a:ln>
-          <a:effectLst>
-            <a:outerShdw blurRad="50800" dist="38100" dir="8100000" algn="tr" rotWithShape="0">
-              <a:prstClr val="black">
-                <a:alpha val="40000"/>
-              </a:prstClr>
-            </a:outerShdw>
-          </a:effectLst>
         </p:spPr>
-        <p:style>
-          <a:lnRef idx="0">
-            <a:scrgbClr r="0" g="0" b="0"/>
-          </a:lnRef>
-          <a:fillRef idx="0">
-            <a:scrgbClr r="0" g="0" b="0"/>
-          </a:fillRef>
-          <a:effectRef idx="0">
-            <a:scrgbClr r="0" g="0" b="0"/>
-          </a:effectRef>
-          <a:fontRef idx="minor">
-            <a:schemeClr val="lt1"/>
-          </a:fontRef>
-        </p:style>
-        <p:txBody>
-          <a:bodyPr rtlCol="0" anchor="ctr"/>
-          <a:lstStyle/>
-          <a:p>
-            <a:pPr algn="ctr"/>
-            <a:endParaRPr lang="en-US"/>
-          </a:p>
-        </p:txBody>
-      </p:sp>
+      </p:pic>
     </p:spTree>
     <p:extLst>
       <p:ext uri="{BB962C8B-B14F-4D97-AF65-F5344CB8AC3E}">

</xml_diff>